<commit_message>
idea2 changes a lot
</commit_message>
<xml_diff>
--- a/drawgraph.pptx
+++ b/drawgraph.pptx
@@ -7,6 +7,7 @@
   <p:sldIdLst>
     <p:sldId id="256" r:id="rId2"/>
     <p:sldId id="257" r:id="rId3"/>
+    <p:sldId id="258" r:id="rId4"/>
   </p:sldIdLst>
   <p:sldSz cx="12192000" cy="6858000"/>
   <p:notesSz cx="6858000" cy="9144000"/>
@@ -105,6 +106,11 @@
       </a:defRPr>
     </a:lvl9pPr>
   </p:defaultTextStyle>
+  <p:extLst>
+    <p:ext uri="{EFAFB233-063F-42B5-8137-9DF3F51BA10A}">
+      <p15:sldGuideLst xmlns:p15="http://schemas.microsoft.com/office/powerpoint/2012/main"/>
+    </p:ext>
+  </p:extLst>
 </p:presentation>
 </file>
 
@@ -261,7 +267,7 @@
           <a:p>
             <a:fld id="{D602799E-A0DB-4E2F-A4E0-DB6D61299214}" type="datetimeFigureOut">
               <a:rPr lang="en-US" smtClean="0"/>
-              <a:t>9/17/2017</a:t>
+              <a:t>11/15/2017</a:t>
             </a:fld>
             <a:endParaRPr lang="en-US"/>
           </a:p>
@@ -461,7 +467,7 @@
           <a:p>
             <a:fld id="{D602799E-A0DB-4E2F-A4E0-DB6D61299214}" type="datetimeFigureOut">
               <a:rPr lang="en-US" smtClean="0"/>
-              <a:t>9/17/2017</a:t>
+              <a:t>11/15/2017</a:t>
             </a:fld>
             <a:endParaRPr lang="en-US"/>
           </a:p>
@@ -671,7 +677,7 @@
           <a:p>
             <a:fld id="{D602799E-A0DB-4E2F-A4E0-DB6D61299214}" type="datetimeFigureOut">
               <a:rPr lang="en-US" smtClean="0"/>
-              <a:t>9/17/2017</a:t>
+              <a:t>11/15/2017</a:t>
             </a:fld>
             <a:endParaRPr lang="en-US"/>
           </a:p>
@@ -871,7 +877,7 @@
           <a:p>
             <a:fld id="{D602799E-A0DB-4E2F-A4E0-DB6D61299214}" type="datetimeFigureOut">
               <a:rPr lang="en-US" smtClean="0"/>
-              <a:t>9/17/2017</a:t>
+              <a:t>11/15/2017</a:t>
             </a:fld>
             <a:endParaRPr lang="en-US"/>
           </a:p>
@@ -1147,7 +1153,7 @@
           <a:p>
             <a:fld id="{D602799E-A0DB-4E2F-A4E0-DB6D61299214}" type="datetimeFigureOut">
               <a:rPr lang="en-US" smtClean="0"/>
-              <a:t>9/17/2017</a:t>
+              <a:t>11/15/2017</a:t>
             </a:fld>
             <a:endParaRPr lang="en-US"/>
           </a:p>
@@ -1415,7 +1421,7 @@
           <a:p>
             <a:fld id="{D602799E-A0DB-4E2F-A4E0-DB6D61299214}" type="datetimeFigureOut">
               <a:rPr lang="en-US" smtClean="0"/>
-              <a:t>9/17/2017</a:t>
+              <a:t>11/15/2017</a:t>
             </a:fld>
             <a:endParaRPr lang="en-US"/>
           </a:p>
@@ -1830,7 +1836,7 @@
           <a:p>
             <a:fld id="{D602799E-A0DB-4E2F-A4E0-DB6D61299214}" type="datetimeFigureOut">
               <a:rPr lang="en-US" smtClean="0"/>
-              <a:t>9/17/2017</a:t>
+              <a:t>11/15/2017</a:t>
             </a:fld>
             <a:endParaRPr lang="en-US"/>
           </a:p>
@@ -1972,7 +1978,7 @@
           <a:p>
             <a:fld id="{D602799E-A0DB-4E2F-A4E0-DB6D61299214}" type="datetimeFigureOut">
               <a:rPr lang="en-US" smtClean="0"/>
-              <a:t>9/17/2017</a:t>
+              <a:t>11/15/2017</a:t>
             </a:fld>
             <a:endParaRPr lang="en-US"/>
           </a:p>
@@ -2085,7 +2091,7 @@
           <a:p>
             <a:fld id="{D602799E-A0DB-4E2F-A4E0-DB6D61299214}" type="datetimeFigureOut">
               <a:rPr lang="en-US" smtClean="0"/>
-              <a:t>9/17/2017</a:t>
+              <a:t>11/15/2017</a:t>
             </a:fld>
             <a:endParaRPr lang="en-US"/>
           </a:p>
@@ -2398,7 +2404,7 @@
           <a:p>
             <a:fld id="{D602799E-A0DB-4E2F-A4E0-DB6D61299214}" type="datetimeFigureOut">
               <a:rPr lang="en-US" smtClean="0"/>
-              <a:t>9/17/2017</a:t>
+              <a:t>11/15/2017</a:t>
             </a:fld>
             <a:endParaRPr lang="en-US"/>
           </a:p>
@@ -2687,7 +2693,7 @@
           <a:p>
             <a:fld id="{D602799E-A0DB-4E2F-A4E0-DB6D61299214}" type="datetimeFigureOut">
               <a:rPr lang="en-US" smtClean="0"/>
-              <a:t>9/17/2017</a:t>
+              <a:t>11/15/2017</a:t>
             </a:fld>
             <a:endParaRPr lang="en-US"/>
           </a:p>
@@ -2930,7 +2936,7 @@
           <a:p>
             <a:fld id="{D602799E-A0DB-4E2F-A4E0-DB6D61299214}" type="datetimeFigureOut">
               <a:rPr lang="en-US" smtClean="0"/>
-              <a:t>9/17/2017</a:t>
+              <a:t>11/15/2017</a:t>
             </a:fld>
             <a:endParaRPr lang="en-US"/>
           </a:p>
@@ -3382,7 +3388,7 @@
             <p:nvPr/>
           </p:nvPicPr>
           <p:blipFill>
-            <a:blip r:embed="rId3"/>
+            <a:blip r:embed="rId2"/>
             <a:stretch>
               <a:fillRect/>
             </a:stretch>
@@ -4842,6 +4848,200 @@
 </p:sld>
 </file>
 
+<file path=ppt/slides/slide3.xml><?xml version="1.0" encoding="utf-8"?>
+<p:sld xmlns:a="http://schemas.openxmlformats.org/drawingml/2006/main" xmlns:r="http://schemas.openxmlformats.org/officeDocument/2006/relationships" xmlns:p="http://schemas.openxmlformats.org/presentationml/2006/main">
+  <p:cSld>
+    <p:spTree>
+      <p:nvGrpSpPr>
+        <p:cNvPr id="1" name=""/>
+        <p:cNvGrpSpPr/>
+        <p:nvPr/>
+      </p:nvGrpSpPr>
+      <p:grpSpPr>
+        <a:xfrm>
+          <a:off x="0" y="0"/>
+          <a:ext cx="0" cy="0"/>
+          <a:chOff x="0" y="0"/>
+          <a:chExt cx="0" cy="0"/>
+        </a:xfrm>
+      </p:grpSpPr>
+      <p:pic>
+        <p:nvPicPr>
+          <p:cNvPr id="5" name="图形 4" descr="用户">
+            <a:extLst>
+              <a:ext uri="{FF2B5EF4-FFF2-40B4-BE49-F238E27FC236}">
+                <a16:creationId xmlns:a16="http://schemas.microsoft.com/office/drawing/2014/main" id="{7E815362-318E-41F2-B183-2A5ED4F9993D}"/>
+              </a:ext>
+            </a:extLst>
+          </p:cNvPr>
+          <p:cNvPicPr>
+            <a:picLocks noChangeAspect="1"/>
+          </p:cNvPicPr>
+          <p:nvPr/>
+        </p:nvPicPr>
+        <p:blipFill>
+          <a:blip r:embed="rId2">
+            <a:extLst>
+              <a:ext uri="{28A0092B-C50C-407E-A947-70E740481C1C}">
+                <a14:useLocalDpi xmlns:a14="http://schemas.microsoft.com/office/drawing/2010/main" val="0"/>
+              </a:ext>
+              <a:ext uri="{96DAC541-7B7A-43D3-8B79-37D633B846F1}">
+                <asvg:svgBlip xmlns:asvg="http://schemas.microsoft.com/office/drawing/2016/SVG/main" r:embed="rId3"/>
+              </a:ext>
+            </a:extLst>
+          </a:blip>
+          <a:stretch>
+            <a:fillRect/>
+          </a:stretch>
+        </p:blipFill>
+        <p:spPr>
+          <a:xfrm>
+            <a:off x="2980266" y="2142066"/>
+            <a:ext cx="694267" cy="694267"/>
+          </a:xfrm>
+          <a:prstGeom prst="rect">
+            <a:avLst/>
+          </a:prstGeom>
+        </p:spPr>
+      </p:pic>
+      <p:pic>
+        <p:nvPicPr>
+          <p:cNvPr id="7" name="图片 6">
+            <a:extLst>
+              <a:ext uri="{FF2B5EF4-FFF2-40B4-BE49-F238E27FC236}">
+                <a16:creationId xmlns:a16="http://schemas.microsoft.com/office/drawing/2014/main" id="{E92C2E89-F640-4521-B395-9A355176A3DF}"/>
+              </a:ext>
+            </a:extLst>
+          </p:cNvPr>
+          <p:cNvPicPr>
+            <a:picLocks noChangeAspect="1"/>
+          </p:cNvPicPr>
+          <p:nvPr/>
+        </p:nvPicPr>
+        <p:blipFill>
+          <a:blip r:embed="rId4"/>
+          <a:stretch>
+            <a:fillRect/>
+          </a:stretch>
+        </p:blipFill>
+        <p:spPr>
+          <a:xfrm>
+            <a:off x="4902381" y="3743460"/>
+            <a:ext cx="761820" cy="1024674"/>
+          </a:xfrm>
+          <a:prstGeom prst="rect">
+            <a:avLst/>
+          </a:prstGeom>
+        </p:spPr>
+      </p:pic>
+      <mc:AlternateContent xmlns:mc="http://schemas.openxmlformats.org/markup-compatibility/2006">
+        <mc:Choice xmlns:a14="http://schemas.microsoft.com/office/drawing/2010/main" Requires="a14">
+          <p:sp>
+            <p:nvSpPr>
+              <p:cNvPr id="8" name="文本框 7">
+                <a:extLst>
+                  <a:ext uri="{FF2B5EF4-FFF2-40B4-BE49-F238E27FC236}">
+                    <a16:creationId xmlns:a16="http://schemas.microsoft.com/office/drawing/2014/main" id="{9B57CB99-16DD-4933-898D-902D0B965C7B}"/>
+                  </a:ext>
+                </a:extLst>
+              </p:cNvPr>
+              <p:cNvSpPr txBox="1"/>
+              <p:nvPr/>
+            </p:nvSpPr>
+            <p:spPr>
+              <a:xfrm>
+                <a:off x="3175000" y="3031067"/>
+                <a:ext cx="528478" cy="369332"/>
+              </a:xfrm>
+              <a:prstGeom prst="rect">
+                <a:avLst/>
+              </a:prstGeom>
+              <a:noFill/>
+            </p:spPr>
+            <p:txBody>
+              <a:bodyPr wrap="none" rtlCol="0">
+                <a:spAutoFit/>
+              </a:bodyPr>
+              <a:lstStyle/>
+              <a:p>
+                <a14:m>
+                  <m:oMathPara xmlns:m="http://schemas.openxmlformats.org/officeDocument/2006/math">
+                    <m:oMathParaPr>
+                      <m:jc m:val="centerGroup"/>
+                    </m:oMathParaPr>
+                    <m:oMath xmlns:m="http://schemas.openxmlformats.org/officeDocument/2006/math">
+                      <m:r>
+                        <a:rPr lang="en-US" b="0" i="1" smtClean="0">
+                          <a:latin typeface="Cambria Math" panose="02040503050406030204" pitchFamily="18" charset="0"/>
+                        </a:rPr>
+                        <m:t>𝐴𝑔</m:t>
+                      </m:r>
+                    </m:oMath>
+                  </m:oMathPara>
+                </a14:m>
+                <a:endParaRPr lang="en-US" dirty="0"/>
+              </a:p>
+            </p:txBody>
+          </p:sp>
+        </mc:Choice>
+        <mc:Fallback>
+          <p:sp>
+            <p:nvSpPr>
+              <p:cNvPr id="8" name="文本框 7">
+                <a:extLst>
+                  <a:ext uri="{FF2B5EF4-FFF2-40B4-BE49-F238E27FC236}">
+                    <a16:creationId xmlns:a16="http://schemas.microsoft.com/office/drawing/2014/main" id="{9B57CB99-16DD-4933-898D-902D0B965C7B}"/>
+                  </a:ext>
+                </a:extLst>
+              </p:cNvPr>
+              <p:cNvSpPr txBox="1">
+                <a:spLocks noRot="1" noChangeAspect="1" noMove="1" noResize="1" noEditPoints="1" noAdjustHandles="1" noChangeArrowheads="1" noChangeShapeType="1" noTextEdit="1"/>
+              </p:cNvSpPr>
+              <p:nvPr/>
+            </p:nvSpPr>
+            <p:spPr>
+              <a:xfrm>
+                <a:off x="3175000" y="3031067"/>
+                <a:ext cx="528478" cy="369332"/>
+              </a:xfrm>
+              <a:prstGeom prst="rect">
+                <a:avLst/>
+              </a:prstGeom>
+              <a:blipFill>
+                <a:blip r:embed="rId5"/>
+                <a:stretch>
+                  <a:fillRect b="-11475"/>
+                </a:stretch>
+              </a:blipFill>
+            </p:spPr>
+            <p:txBody>
+              <a:bodyPr/>
+              <a:lstStyle/>
+              <a:p>
+                <a:r>
+                  <a:rPr lang="en-US">
+                    <a:noFill/>
+                  </a:rPr>
+                  <a:t> </a:t>
+                </a:r>
+              </a:p>
+            </p:txBody>
+          </p:sp>
+        </mc:Fallback>
+      </mc:AlternateContent>
+    </p:spTree>
+    <p:extLst>
+      <p:ext uri="{BB962C8B-B14F-4D97-AF65-F5344CB8AC3E}">
+        <p14:creationId xmlns:p14="http://schemas.microsoft.com/office/powerpoint/2010/main" val="3734190016"/>
+      </p:ext>
+    </p:extLst>
+  </p:cSld>
+  <p:clrMapOvr>
+    <a:masterClrMapping/>
+  </p:clrMapOvr>
+</p:sld>
+</file>
+
 <file path=ppt/theme/theme1.xml><?xml version="1.0" encoding="utf-8"?>
 <a:theme xmlns:a="http://schemas.openxmlformats.org/drawingml/2006/main" name="Office 主题​​">
   <a:themeElements>

</xml_diff>